<commit_message>
Updated for FabCon Las Vegas 2025
</commit_message>
<xml_diff>
--- a/Microsoft Fabric/Tips and Tricks for Microsoft Fabric Data Warehouse/20250206 - Fabric February 2025 - Tips and Tricks for Microsoft Fabric Data Warehouse.pptx
+++ b/Microsoft Fabric/Tips and Tricks for Microsoft Fabric Data Warehouse/20250206 - Fabric February 2025 - Tips and Tricks for Microsoft Fabric Data Warehouse.pptx
@@ -256,7 +256,7 @@
           <a:p>
             <a:fld id="{8DB4B101-3225-4967-95B5-ED5755256DE0}" type="datetimeFigureOut">
               <a:rPr lang="en-GB" smtClean="0"/>
-              <a:t>06/02/2025</a:t>
+              <a:t>04/03/2025</a:t>
             </a:fld>
             <a:endParaRPr lang="en-GB"/>
           </a:p>
@@ -2632,7 +2632,7 @@
           <a:p>
             <a:fld id="{42A54C80-263E-416B-A8E0-580EDEADCBDC}" type="datetimeFigureOut">
               <a:rPr lang="en-US" dirty="0"/>
-              <a:t>2/6/2025</a:t>
+              <a:t>3/4/2025</a:t>
             </a:fld>
             <a:endParaRPr lang="en-US" dirty="0"/>
           </a:p>
@@ -3439,7 +3439,7 @@
             <a:fld id="{B61BEF0D-F0BB-DE4B-95CE-6DB70DBA9567}" type="datetimeFigureOut">
               <a:rPr lang="en-US" dirty="0"/>
               <a:pPr/>
-              <a:t>2/6/2025</a:t>
+              <a:t>3/4/2025</a:t>
             </a:fld>
             <a:endParaRPr lang="en-US" dirty="0"/>
           </a:p>
@@ -3697,7 +3697,7 @@
           <a:p>
             <a:fld id="{D329D791-F291-4BA1-AFA4-21415D837E1F}" type="datetimeFigureOut">
               <a:rPr lang="en-US" smtClean="0"/>
-              <a:t>2/6/2025</a:t>
+              <a:t>3/4/2025</a:t>
             </a:fld>
             <a:endParaRPr lang="en-US"/>
           </a:p>
@@ -3895,7 +3895,7 @@
           <a:p>
             <a:fld id="{D329D791-F291-4BA1-AFA4-21415D837E1F}" type="datetimeFigureOut">
               <a:rPr lang="en-US" smtClean="0"/>
-              <a:t>2/6/2025</a:t>
+              <a:t>3/4/2025</a:t>
             </a:fld>
             <a:endParaRPr lang="en-US"/>
           </a:p>
@@ -4170,7 +4170,7 @@
           <a:p>
             <a:fld id="{D329D791-F291-4BA1-AFA4-21415D837E1F}" type="datetimeFigureOut">
               <a:rPr lang="en-US" smtClean="0"/>
-              <a:t>2/6/2025</a:t>
+              <a:t>3/4/2025</a:t>
             </a:fld>
             <a:endParaRPr lang="en-US"/>
           </a:p>
@@ -4435,7 +4435,7 @@
           <a:p>
             <a:fld id="{D329D791-F291-4BA1-AFA4-21415D837E1F}" type="datetimeFigureOut">
               <a:rPr lang="en-US" smtClean="0"/>
-              <a:t>2/6/2025</a:t>
+              <a:t>3/4/2025</a:t>
             </a:fld>
             <a:endParaRPr lang="en-US"/>
           </a:p>
@@ -4847,7 +4847,7 @@
           <a:p>
             <a:fld id="{D329D791-F291-4BA1-AFA4-21415D837E1F}" type="datetimeFigureOut">
               <a:rPr lang="en-US" smtClean="0"/>
-              <a:t>2/6/2025</a:t>
+              <a:t>3/4/2025</a:t>
             </a:fld>
             <a:endParaRPr lang="en-US"/>
           </a:p>
@@ -5094,7 +5094,7 @@
           <a:p>
             <a:fld id="{D329D791-F291-4BA1-AFA4-21415D837E1F}" type="datetimeFigureOut">
               <a:rPr lang="en-US" smtClean="0"/>
-              <a:t>2/6/2025</a:t>
+              <a:t>3/4/2025</a:t>
             </a:fld>
             <a:endParaRPr lang="en-US"/>
           </a:p>
@@ -5207,7 +5207,7 @@
           <a:p>
             <a:fld id="{D329D791-F291-4BA1-AFA4-21415D837E1F}" type="datetimeFigureOut">
               <a:rPr lang="en-US" smtClean="0"/>
-              <a:t>2/6/2025</a:t>
+              <a:t>3/4/2025</a:t>
             </a:fld>
             <a:endParaRPr lang="en-US"/>
           </a:p>
@@ -5518,7 +5518,7 @@
           <a:p>
             <a:fld id="{D329D791-F291-4BA1-AFA4-21415D837E1F}" type="datetimeFigureOut">
               <a:rPr lang="en-US" smtClean="0"/>
-              <a:t>2/6/2025</a:t>
+              <a:t>3/4/2025</a:t>
             </a:fld>
             <a:endParaRPr lang="en-US"/>
           </a:p>
@@ -5806,7 +5806,7 @@
           <a:p>
             <a:fld id="{D329D791-F291-4BA1-AFA4-21415D837E1F}" type="datetimeFigureOut">
               <a:rPr lang="en-US" smtClean="0"/>
-              <a:t>2/6/2025</a:t>
+              <a:t>3/4/2025</a:t>
             </a:fld>
             <a:endParaRPr lang="en-US"/>
           </a:p>
@@ -6004,7 +6004,7 @@
           <a:p>
             <a:fld id="{D329D791-F291-4BA1-AFA4-21415D837E1F}" type="datetimeFigureOut">
               <a:rPr lang="en-US" smtClean="0"/>
-              <a:t>2/6/2025</a:t>
+              <a:t>3/4/2025</a:t>
             </a:fld>
             <a:endParaRPr lang="en-US"/>
           </a:p>
@@ -6212,7 +6212,7 @@
           <a:p>
             <a:fld id="{D329D791-F291-4BA1-AFA4-21415D837E1F}" type="datetimeFigureOut">
               <a:rPr lang="en-US" smtClean="0"/>
-              <a:t>2/6/2025</a:t>
+              <a:t>3/4/2025</a:t>
             </a:fld>
             <a:endParaRPr lang="en-US"/>
           </a:p>
@@ -9457,7 +9457,7 @@
           <a:p>
             <a:fld id="{D329D791-F291-4BA1-AFA4-21415D837E1F}" type="datetimeFigureOut">
               <a:rPr lang="en-US" smtClean="0"/>
-              <a:t>2/6/2025</a:t>
+              <a:t>3/4/2025</a:t>
             </a:fld>
             <a:endParaRPr lang="en-US"/>
           </a:p>
@@ -17006,17 +17006,6 @@
 </file>
 
 <file path=customXml/item2.xml><?xml version="1.0" encoding="utf-8"?>
-<p:properties xmlns:p="http://schemas.microsoft.com/office/2006/metadata/properties" xmlns:xsi="http://www.w3.org/2001/XMLSchema-instance" xmlns:pc="http://schemas.microsoft.com/office/infopath/2007/PartnerControls">
-  <documentManagement>
-    <TaxCatchAll xmlns="1b3b1065-ae42-4d8a-aa8c-0a73a17faba8" xsi:nil="true"/>
-    <lcf76f155ced4ddcb4097134ff3c332f xmlns="221fbb9a-23db-4311-a69c-34622b264696">
-      <Terms xmlns="http://schemas.microsoft.com/office/infopath/2007/PartnerControls"/>
-    </lcf76f155ced4ddcb4097134ff3c332f>
-  </documentManagement>
-</p:properties>
-</file>
-
-<file path=customXml/item3.xml><?xml version="1.0" encoding="utf-8"?>
 <ct:contentTypeSchema xmlns:ct="http://schemas.microsoft.com/office/2006/metadata/contentType" xmlns:ma="http://schemas.microsoft.com/office/2006/metadata/properties/metaAttributes" ct:_="" ma:_="" ma:contentTypeName="Document" ma:contentTypeID="0x010100A051F54D7AD26C459333D1AFF09839BE" ma:contentTypeVersion="13" ma:contentTypeDescription="Create a new document." ma:contentTypeScope="" ma:versionID="67d14783cad48c8f1c17fd04aad2844e">
   <xsd:schema xmlns:xsd="http://www.w3.org/2001/XMLSchema" xmlns:xs="http://www.w3.org/2001/XMLSchema" xmlns:p="http://schemas.microsoft.com/office/2006/metadata/properties" xmlns:ns2="221fbb9a-23db-4311-a69c-34622b264696" xmlns:ns3="1b3b1065-ae42-4d8a-aa8c-0a73a17faba8" targetNamespace="http://schemas.microsoft.com/office/2006/metadata/properties" ma:root="true" ma:fieldsID="b4d119d5f38a942363b48477808fa009" ns2:_="" ns3:_="">
     <xsd:import namespace="221fbb9a-23db-4311-a69c-34622b264696"/>
@@ -17223,6 +17212,17 @@
 </ct:contentTypeSchema>
 </file>
 
+<file path=customXml/item3.xml><?xml version="1.0" encoding="utf-8"?>
+<p:properties xmlns:p="http://schemas.microsoft.com/office/2006/metadata/properties" xmlns:xsi="http://www.w3.org/2001/XMLSchema-instance" xmlns:pc="http://schemas.microsoft.com/office/infopath/2007/PartnerControls">
+  <documentManagement>
+    <TaxCatchAll xmlns="1b3b1065-ae42-4d8a-aa8c-0a73a17faba8" xsi:nil="true"/>
+    <lcf76f155ced4ddcb4097134ff3c332f xmlns="221fbb9a-23db-4311-a69c-34622b264696">
+      <Terms xmlns="http://schemas.microsoft.com/office/infopath/2007/PartnerControls"/>
+    </lcf76f155ced4ddcb4097134ff3c332f>
+  </documentManagement>
+</p:properties>
+</file>
+
 <file path=customXml/itemProps1.xml><?xml version="1.0" encoding="utf-8"?>
 <ds:datastoreItem xmlns:ds="http://schemas.openxmlformats.org/officeDocument/2006/customXml" ds:itemID="{B6782FBD-C4AD-49F1-B11B-703DF9FAD87C}">
   <ds:schemaRefs>
@@ -17232,23 +17232,6 @@
 </file>
 
 <file path=customXml/itemProps2.xml><?xml version="1.0" encoding="utf-8"?>
-<ds:datastoreItem xmlns:ds="http://schemas.openxmlformats.org/officeDocument/2006/customXml" ds:itemID="{D05C0892-D583-430B-AD43-D1A4EB1EE043}">
-  <ds:schemaRefs>
-    <ds:schemaRef ds:uri="http://purl.org/dc/elements/1.1/"/>
-    <ds:schemaRef ds:uri="http://schemas.microsoft.com/office/2006/documentManagement/types"/>
-    <ds:schemaRef ds:uri="http://schemas.microsoft.com/office/infopath/2007/PartnerControls"/>
-    <ds:schemaRef ds:uri="http://schemas.microsoft.com/office/2006/metadata/properties"/>
-    <ds:schemaRef ds:uri="http://purl.org/dc/dcmitype/"/>
-    <ds:schemaRef ds:uri="http://purl.org/dc/terms/"/>
-    <ds:schemaRef ds:uri="1b3b1065-ae42-4d8a-aa8c-0a73a17faba8"/>
-    <ds:schemaRef ds:uri="221fbb9a-23db-4311-a69c-34622b264696"/>
-    <ds:schemaRef ds:uri="http://www.w3.org/XML/1998/namespace"/>
-    <ds:schemaRef ds:uri="http://schemas.openxmlformats.org/package/2006/metadata/core-properties"/>
-  </ds:schemaRefs>
-</ds:datastoreItem>
-</file>
-
-<file path=customXml/itemProps3.xml><?xml version="1.0" encoding="utf-8"?>
 <ds:datastoreItem xmlns:ds="http://schemas.openxmlformats.org/officeDocument/2006/customXml" ds:itemID="{016DC293-461E-49ED-8D5B-E76742C2D2DC}">
   <ds:schemaRefs>
     <ds:schemaRef ds:uri="http://schemas.microsoft.com/office/2006/metadata/contentType"/>
@@ -17265,4 +17248,21 @@
     <ds:schemaRef ds:uri="http://schemas.microsoft.com/internal/obd"/>
   </ds:schemaRefs>
 </ds:datastoreItem>
+</file>
+
+<file path=customXml/itemProps3.xml><?xml version="1.0" encoding="utf-8"?>
+<ds:datastoreItem xmlns:ds="http://schemas.openxmlformats.org/officeDocument/2006/customXml" ds:itemID="{D05C0892-D583-430B-AD43-D1A4EB1EE043}">
+  <ds:schemaRefs>
+    <ds:schemaRef ds:uri="http://purl.org/dc/elements/1.1/"/>
+    <ds:schemaRef ds:uri="http://schemas.microsoft.com/office/2006/documentManagement/types"/>
+    <ds:schemaRef ds:uri="http://schemas.microsoft.com/office/infopath/2007/PartnerControls"/>
+    <ds:schemaRef ds:uri="http://schemas.microsoft.com/office/2006/metadata/properties"/>
+    <ds:schemaRef ds:uri="http://purl.org/dc/dcmitype/"/>
+    <ds:schemaRef ds:uri="http://purl.org/dc/terms/"/>
+    <ds:schemaRef ds:uri="1b3b1065-ae42-4d8a-aa8c-0a73a17faba8"/>
+    <ds:schemaRef ds:uri="221fbb9a-23db-4311-a69c-34622b264696"/>
+    <ds:schemaRef ds:uri="http://www.w3.org/XML/1998/namespace"/>
+    <ds:schemaRef ds:uri="http://schemas.openxmlformats.org/package/2006/metadata/core-properties"/>
+  </ds:schemaRefs>
+</ds:datastoreItem>
 </file>
</xml_diff>